<commit_message>
Error handling and proper display  of contextual errors, fully functional progress spinner
</commit_message>
<xml_diff>
--- a/etc/Final Presentation.pptx
+++ b/etc/Final Presentation.pptx
@@ -7804,11 +7804,7 @@
           <a:p>
             <a:r>
               <a:rPr lang="en-US" dirty="0" err="1" smtClean="0"/>
-              <a:t>MetaCriti</a:t>
-            </a:r>
-            <a:r>
-              <a:rPr lang="en-US" dirty="0" err="1" smtClean="0"/>
-              <a:t>que</a:t>
+              <a:t>MetaCritique</a:t>
             </a:r>
             <a:endParaRPr lang="en-US" dirty="0"/>
           </a:p>
@@ -8056,11 +8052,7 @@
           <a:p>
             <a:r>
               <a:rPr lang="en-US" dirty="0" smtClean="0"/>
-              <a:t>10</a:t>
-            </a:r>
-            <a:r>
-              <a:rPr lang="en-US" dirty="0" smtClean="0"/>
-              <a:t> components to a result: Title, score, critic reviews link, etc.</a:t>
+              <a:t>10 components to a result: Title, score, critic reviews link, etc.</a:t>
             </a:r>
           </a:p>
           <a:p>
@@ -8290,11 +8282,7 @@
           <a:p>
             <a:r>
               <a:rPr lang="en-US" dirty="0" smtClean="0"/>
-              <a:t>E.G. “</a:t>
-            </a:r>
-            <a:r>
-              <a:rPr lang="en-US" dirty="0" smtClean="0"/>
-              <a:t>&lt;</a:t>
+              <a:t>E.G. “&lt;</a:t>
             </a:r>
             <a:r>
               <a:rPr lang="en-US" dirty="0"/>
@@ -8395,11 +8383,11 @@
   <p:clrMapOvr>
     <a:masterClrMapping/>
   </p:clrMapOvr>
-  <mc:AlternateContent xmlns:mc="http://schemas.openxmlformats.org/markup-compatibility/2006">
-    <mc:Choice xmlns:p14="http://schemas.microsoft.com/office/powerpoint/2010/main" Requires="p14">
+  <mc:AlternateContent xmlns:mc="http://schemas.openxmlformats.org/markup-compatibility/2006" xmlns:p14="http://schemas.microsoft.com/office/powerpoint/2010/main">
+    <mc:Choice Requires="p14">
       <p:transition spd="slow" p14:dur="2000" advTm="15000"/>
     </mc:Choice>
-    <mc:Fallback>
+    <mc:Fallback xmlns="">
       <p:transition spd="slow" advTm="15000"/>
     </mc:Fallback>
   </mc:AlternateContent>
@@ -9053,8 +9041,38 @@
             </a:r>
             <a:r>
               <a:rPr lang="en-US" dirty="0" smtClean="0"/>
-              <a:t> keyboard when a user taps outside the keyboard</a:t>
-            </a:r>
+              <a:t> keyboard when a user taps outside the </a:t>
+            </a:r>
+            <a:r>
+              <a:rPr lang="en-US" dirty="0" smtClean="0"/>
+              <a:t>keyboard</a:t>
+            </a:r>
+          </a:p>
+          <a:p>
+            <a:pPr marL="0" indent="0">
+              <a:buNone/>
+            </a:pPr>
+            <a:r>
+              <a:rPr lang="en-US" dirty="0" smtClean="0"/>
+              <a:t>Add touch listener to the main </a:t>
+            </a:r>
+            <a:r>
+              <a:rPr lang="en-US" dirty="0" err="1" smtClean="0"/>
+              <a:t>RelativeLayout</a:t>
+            </a:r>
+            <a:r>
+              <a:rPr lang="en-US" dirty="0"/>
+              <a:t>:</a:t>
+            </a:r>
+            <a:r>
+              <a:rPr lang="en-US" dirty="0" smtClean="0"/>
+              <a:t> if tapped, hide contextual keyboard currently </a:t>
+            </a:r>
+            <a:r>
+              <a:rPr lang="en-US" smtClean="0"/>
+              <a:t>being displayed</a:t>
+            </a:r>
+            <a:endParaRPr lang="en-US" dirty="0" smtClean="0"/>
           </a:p>
           <a:p>
             <a:pPr marL="0" indent="0">
@@ -9612,11 +9630,11 @@
   <p:clrMapOvr>
     <a:masterClrMapping/>
   </p:clrMapOvr>
-  <mc:AlternateContent xmlns:mc="http://schemas.openxmlformats.org/markup-compatibility/2006">
-    <mc:Choice xmlns:p14="http://schemas.microsoft.com/office/powerpoint/2010/main" Requires="p14">
+  <mc:AlternateContent xmlns:mc="http://schemas.openxmlformats.org/markup-compatibility/2006" xmlns:p14="http://schemas.microsoft.com/office/powerpoint/2010/main">
+    <mc:Choice Requires="p14">
       <p:transition spd="slow" p14:dur="2000" advTm="15000"/>
     </mc:Choice>
-    <mc:Fallback>
+    <mc:Fallback xmlns="">
       <p:transition spd="slow" advTm="15000"/>
     </mc:Fallback>
   </mc:AlternateContent>
@@ -9758,7 +9776,6 @@
               <a:rPr lang="en-US" dirty="0" smtClean="0"/>
               <a:t>For critic reviews, user reviews</a:t>
             </a:r>
-            <a:endParaRPr lang="en-US" dirty="0" smtClean="0"/>
           </a:p>
         </p:txBody>
       </p:sp>
@@ -12423,11 +12440,11 @@
   <p:clrMapOvr>
     <a:masterClrMapping/>
   </p:clrMapOvr>
-  <mc:AlternateContent xmlns:mc="http://schemas.openxmlformats.org/markup-compatibility/2006">
-    <mc:Choice xmlns:p14="http://schemas.microsoft.com/office/powerpoint/2010/main" Requires="p14">
+  <mc:AlternateContent xmlns:mc="http://schemas.openxmlformats.org/markup-compatibility/2006" xmlns:p14="http://schemas.microsoft.com/office/powerpoint/2010/main">
+    <mc:Choice Requires="p14">
       <p:transition spd="slow" p14:dur="2000" advTm="15000"/>
     </mc:Choice>
-    <mc:Fallback>
+    <mc:Fallback xmlns="">
       <p:transition spd="slow" advTm="15000"/>
     </mc:Fallback>
   </mc:AlternateContent>

</xml_diff>